<commit_message>
Updated Refactoring Cookbooks with Test
Instead of deleting the include_recipe in the default recipe I opted instead to comment out the methods so that it will be easier to bring them back.
</commit_message>
<xml_diff>
--- a/02-refactoring_cookbooks_with_tests.pptx
+++ b/02-refactoring_cookbooks_with_tests.pptx
@@ -283,7 +283,7 @@
               <a:pPr>
                 <a:defRPr/>
               </a:pPr>
-              <a:t>10/22/15</a:t>
+              <a:t>10/26/15</a:t>
             </a:fld>
             <a:endParaRPr lang="en-US" dirty="0"/>
           </a:p>
@@ -466,7 +466,7 @@
               <a:pPr>
                 <a:defRPr/>
               </a:pPr>
-              <a:t>10/22/15</a:t>
+              <a:t>10/26/15</a:t>
             </a:fld>
             <a:endParaRPr lang="en-US" dirty="0"/>
           </a:p>
@@ -9422,11 +9422,7 @@
           <a:p>
             <a:r>
               <a:rPr lang="en-US" dirty="0" smtClean="0"/>
-              <a:t>Refactoring Cookbooks </a:t>
-            </a:r>
-            <a:r>
-              <a:rPr lang="en-US" dirty="0" smtClean="0"/>
-              <a:t>with Tests</a:t>
+              <a:t>Refactoring Cookbooks with Tests</a:t>
             </a:r>
             <a:endParaRPr lang="en-US" dirty="0"/>
           </a:p>
@@ -10728,7 +10724,11 @@
             </a:pPr>
             <a:r>
               <a:rPr lang="en-US" dirty="0" smtClean="0"/>
-              <a:t>Remove source code</a:t>
+              <a:t>Remove / Comment source </a:t>
+            </a:r>
+            <a:r>
+              <a:rPr lang="en-US" dirty="0" smtClean="0"/>
+              <a:t>code</a:t>
             </a:r>
           </a:p>
           <a:p>
@@ -10866,12 +10866,20 @@
           </a:p>
           <a:p>
             <a:r>
-              <a:rPr lang="en-US" dirty="0" err="1"/>
+              <a:rPr lang="en-US" dirty="0" smtClean="0"/>
+              <a:t># </a:t>
+            </a:r>
+            <a:r>
+              <a:rPr lang="en-US" dirty="0" err="1" smtClean="0"/>
               <a:t>include_recipe</a:t>
             </a:r>
             <a:r>
+              <a:rPr lang="en-US" dirty="0" smtClean="0"/>
+              <a:t> </a:t>
+            </a:r>
+            <a:r>
               <a:rPr lang="en-US" dirty="0"/>
-              <a:t> '</a:t>
+              <a:t>'</a:t>
             </a:r>
             <a:r>
               <a:rPr lang="en-US" dirty="0" err="1"/>
@@ -10884,12 +10892,20 @@
           </a:p>
           <a:p>
             <a:r>
-              <a:rPr lang="en-US" dirty="0" err="1"/>
+              <a:rPr lang="en-US" dirty="0" smtClean="0"/>
+              <a:t># </a:t>
+            </a:r>
+            <a:r>
+              <a:rPr lang="en-US" dirty="0" err="1" smtClean="0"/>
               <a:t>include_recipe</a:t>
             </a:r>
             <a:r>
+              <a:rPr lang="en-US" dirty="0" smtClean="0"/>
+              <a:t> </a:t>
+            </a:r>
+            <a:r>
               <a:rPr lang="en-US" dirty="0"/>
-              <a:t> '</a:t>
+              <a:t>'</a:t>
             </a:r>
             <a:r>
               <a:rPr lang="en-US" dirty="0" err="1"/>
@@ -10955,6 +10971,11 @@
             <a:off x="1124446" y="4741537"/>
             <a:ext cx="14404273" cy="1207773"/>
           </a:xfrm>
+          <a:solidFill>
+            <a:srgbClr val="108001">
+              <a:alpha val="25000"/>
+            </a:srgbClr>
+          </a:solidFill>
         </p:spPr>
         <p:txBody>
           <a:bodyPr/>
@@ -11097,11 +11118,7 @@
             </a:r>
             <a:r>
               <a:rPr lang="en-US" dirty="0" smtClean="0"/>
-              <a:t> </a:t>
-            </a:r>
-            <a:r>
-              <a:rPr lang="en-US" dirty="0" smtClean="0"/>
-              <a:t>and </a:t>
+              <a:t> and </a:t>
             </a:r>
             <a:r>
               <a:rPr lang="en-US" dirty="0" smtClean="0">
@@ -11218,8 +11235,8 @@
               <a:buChar char="ü"/>
             </a:pPr>
             <a:r>
-              <a:rPr lang="en-US" dirty="0" smtClean="0"/>
-              <a:t>Remove source code</a:t>
+              <a:rPr lang="en-US" dirty="0"/>
+              <a:t>Remove / Comment source code</a:t>
             </a:r>
           </a:p>
           <a:p>
@@ -11228,12 +11245,8 @@
               <a:buChar char="q"/>
             </a:pPr>
             <a:r>
-              <a:rPr lang="en-US" dirty="0"/>
-              <a:t>E</a:t>
-            </a:r>
-            <a:r>
-              <a:rPr lang="en-US" dirty="0" smtClean="0"/>
-              <a:t>xecute </a:t>
+              <a:rPr lang="en-US" dirty="0" smtClean="0"/>
+              <a:t>Execute </a:t>
             </a:r>
             <a:r>
               <a:rPr lang="en-US" dirty="0"/>
@@ -12138,8 +12151,8 @@
               <a:buChar char="ü"/>
             </a:pPr>
             <a:r>
-              <a:rPr lang="en-US" dirty="0" smtClean="0"/>
-              <a:t>Comment out source code</a:t>
+              <a:rPr lang="en-US" dirty="0"/>
+              <a:t>Remove / Comment source code</a:t>
             </a:r>
           </a:p>
           <a:p>
@@ -12148,12 +12161,8 @@
               <a:buChar char="ü"/>
             </a:pPr>
             <a:r>
-              <a:rPr lang="en-US" dirty="0"/>
-              <a:t>E</a:t>
-            </a:r>
-            <a:r>
-              <a:rPr lang="en-US" dirty="0" smtClean="0"/>
-              <a:t>xecute </a:t>
+              <a:rPr lang="en-US" dirty="0" smtClean="0"/>
+              <a:t>Execute </a:t>
             </a:r>
             <a:r>
               <a:rPr lang="en-US" dirty="0"/>
@@ -12313,11 +12322,7 @@
           <a:p>
             <a:r>
               <a:rPr lang="en-US" dirty="0" smtClean="0"/>
-              <a:t>What </a:t>
-            </a:r>
-            <a:r>
-              <a:rPr lang="en-US" dirty="0" smtClean="0"/>
-              <a:t>is the difference between </a:t>
+              <a:t>What is the difference between </a:t>
             </a:r>
             <a:r>
               <a:rPr lang="en-US" dirty="0" smtClean="0">
@@ -12354,11 +12359,7 @@
             </a:r>
             <a:r>
               <a:rPr lang="en-US" dirty="0" smtClean="0"/>
-              <a:t>together</a:t>
-            </a:r>
-            <a:r>
-              <a:rPr lang="en-US" dirty="0" smtClean="0"/>
-              <a:t>?</a:t>
+              <a:t>together?</a:t>
             </a:r>
           </a:p>
           <a:p>
@@ -14220,7 +14221,7 @@
   <a:extraClrSchemeLst/>
   <a:extLst>
     <a:ext uri="{05A4C25C-085E-4340-85A3-A5531E510DB2}">
-      <thm15:themeFamily xmlns:thm15="http://schemas.microsoft.com/office/thememl/2012/main" xmlns="" name="Chef-TemplateComps_v09-16x9-Light.potx" id="{078CEFDB-FA7A-4E36-9964-13EF367585CB}" vid="{8B87B0F3-7308-43D5-8388-E1B49EA02652}"/>
+      <thm15:themeFamily xmlns="" xmlns:thm15="http://schemas.microsoft.com/office/thememl/2012/main" name="Chef-TemplateComps_v09-16x9-Light.potx" id="{078CEFDB-FA7A-4E36-9964-13EF367585CB}" vid="{8B87B0F3-7308-43D5-8388-E1B49EA02652}"/>
     </a:ext>
   </a:extLst>
 </a:theme>
@@ -14602,7 +14603,7 @@
   <a:extraClrSchemeLst/>
   <a:extLst>
     <a:ext uri="{05A4C25C-085E-4340-85A3-A5531E510DB2}">
-      <thm15:themeFamily xmlns:thm15="http://schemas.microsoft.com/office/thememl/2012/main" xmlns="" name="Chef-TemplateComps_v09-16x9-Light.potx" id="{078CEFDB-FA7A-4E36-9964-13EF367585CB}" vid="{8B87B0F3-7308-43D5-8388-E1B49EA02652}"/>
+      <thm15:themeFamily xmlns="" xmlns:thm15="http://schemas.microsoft.com/office/thememl/2012/main" name="Chef-TemplateComps_v09-16x9-Light.potx" id="{078CEFDB-FA7A-4E36-9964-13EF367585CB}" vid="{8B87B0F3-7308-43D5-8388-E1B49EA02652}"/>
     </a:ext>
   </a:extLst>
 </a:theme>

</xml_diff>